<commit_message>
revise the figure of solution 1
</commit_message>
<xml_diff>
--- a/images/ch3_2Btest.pptx
+++ b/images/ch3_2Btest.pptx
@@ -6720,14 +6720,14 @@
           <a:p>
             <a:pPr algn="ctr"/>
             <a:r>
-              <a:rPr lang="en-US" sz="1400" b="1" i="1">
+              <a:rPr lang="zh-CN" altLang="en-US" sz="1400">
                 <a:latin typeface="Cambria Math" panose="02040503050406030204" charset="0"/>
                 <a:ea typeface="MS Mincho" charset="0"/>
                 <a:cs typeface="Cambria Math" panose="02040503050406030204" charset="0"/>
               </a:rPr>
-              <a:t>Loss</a:t>
+              <a:t>损失函数</a:t>
             </a:r>
-            <a:endParaRPr lang="en-US" sz="1400" b="1" i="1">
+            <a:endParaRPr lang="zh-CN" altLang="en-US" sz="1400">
               <a:latin typeface="Cambria Math" panose="02040503050406030204" charset="0"/>
               <a:ea typeface="MS Mincho" charset="0"/>
               <a:cs typeface="Cambria Math" panose="02040503050406030204" charset="0"/>

</xml_diff>

<commit_message>
update the figure of solution 1
</commit_message>
<xml_diff>
--- a/images/ch3_2Btest.pptx
+++ b/images/ch3_2Btest.pptx
@@ -4496,8 +4496,8 @@
             </p:nvSpPr>
             <p:spPr>
               <a:xfrm>
-                <a:off x="991870" y="4933315"/>
-                <a:ext cx="1420495" cy="524510"/>
+                <a:off x="1052513" y="4933315"/>
+                <a:ext cx="1299210" cy="525145"/>
               </a:xfrm>
               <a:prstGeom prst="rect">
                 <a:avLst/>
@@ -4546,7 +4546,7 @@
                           <a:ea typeface="MS Mincho" charset="0"/>
                           <a:cs typeface="Cambria Math" panose="02040503050406030204" charset="0"/>
                         </a:rPr>
-                        <m:t>=(</m:t>
+                        <m:t>={</m:t>
                       </m:r>
                       <m:sSup>
                         <m:sSupPr>
@@ -4656,7 +4656,7 @@
                           <a:ea typeface="MS Mincho" charset="0"/>
                           <a:cs typeface="Cambria Math" panose="02040503050406030204" charset="0"/>
                         </a:rPr>
-                        <m:t>)</m:t>
+                        <m:t>}</m:t>
                       </m:r>
                     </m:oMath>
                   </m:oMathPara>
@@ -4681,8 +4681,8 @@
             </p:nvSpPr>
             <p:spPr>
               <a:xfrm>
-                <a:off x="991870" y="4933315"/>
-                <a:ext cx="1420495" cy="524510"/>
+                <a:off x="1052513" y="4933315"/>
+                <a:ext cx="1299210" cy="525145"/>
               </a:xfrm>
               <a:prstGeom prst="rect">
                 <a:avLst/>
@@ -4690,7 +4690,7 @@
               <a:blipFill rotWithShape="1">
                 <a:blip r:embed="rId3"/>
                 <a:stretch>
-                  <a:fillRect/>
+                  <a:fillRect l="-24" r="24"/>
                 </a:stretch>
               </a:blipFill>
             </p:spPr>

</xml_diff>